<commit_message>
added new network challenge diagram
</commit_message>
<xml_diff>
--- a/docs/SPR-App-Challenges.pptx
+++ b/docs/SPR-App-Challenges.pptx
@@ -7,16 +7,17 @@
     <p:sldMasterId id="2147483692" r:id="rId3"/>
   </p:sldMasterIdLst>
   <p:notesMasterIdLst>
-    <p:notesMasterId r:id="rId8"/>
+    <p:notesMasterId r:id="rId9"/>
   </p:notesMasterIdLst>
   <p:handoutMasterIdLst>
-    <p:handoutMasterId r:id="rId9"/>
+    <p:handoutMasterId r:id="rId10"/>
   </p:handoutMasterIdLst>
   <p:sldIdLst>
     <p:sldId id="439" r:id="rId4"/>
     <p:sldId id="440" r:id="rId5"/>
     <p:sldId id="441" r:id="rId6"/>
     <p:sldId id="438" r:id="rId7"/>
+    <p:sldId id="442" r:id="rId8"/>
   </p:sldIdLst>
   <p:sldSz cx="12192000" cy="6858000"/>
   <p:notesSz cx="6858000" cy="9144000"/>
@@ -124,6 +125,7 @@
             <p14:sldId id="440"/>
             <p14:sldId id="441"/>
             <p14:sldId id="438"/>
+            <p14:sldId id="442"/>
           </p14:sldIdLst>
         </p14:section>
       </p14:sectionLst>
@@ -240,7 +242,7 @@
           <a:p>
             <a:fld id="{49A7721D-1176-A640-AC48-B82F78C92D56}" type="datetimeFigureOut">
               <a:rPr lang="en-US" smtClean="0"/>
-              <a:t>11/9/20</a:t>
+              <a:t>11/10/20</a:t>
             </a:fld>
             <a:endParaRPr lang="en-US" dirty="0"/>
           </a:p>
@@ -417,7 +419,7 @@
           <a:p>
             <a:fld id="{C884A089-FB25-6D46-9D21-F0F04A18BCA8}" type="datetimeFigureOut">
               <a:rPr lang="en-US" smtClean="0"/>
-              <a:t>11/9/20</a:t>
+              <a:t>11/10/20</a:t>
             </a:fld>
             <a:endParaRPr lang="en-US" dirty="0"/>
           </a:p>
@@ -1011,6 +1013,196 @@
     <p:extLst>
       <p:ext uri="{BB962C8B-B14F-4D97-AF65-F5344CB8AC3E}">
         <p14:creationId xmlns:p14="http://schemas.microsoft.com/office/powerpoint/2010/main" val="1640219185"/>
+      </p:ext>
+    </p:extLst>
+  </p:cSld>
+  <p:clrMapOvr>
+    <a:masterClrMapping/>
+  </p:clrMapOvr>
+</p:notes>
+</file>
+
+<file path=ppt/notesSlides/notesSlide5.xml><?xml version="1.0" encoding="utf-8"?>
+<p:notes xmlns:a="http://schemas.openxmlformats.org/drawingml/2006/main" xmlns:r="http://schemas.openxmlformats.org/officeDocument/2006/relationships" xmlns:p="http://schemas.openxmlformats.org/presentationml/2006/main">
+  <p:cSld>
+    <p:spTree>
+      <p:nvGrpSpPr>
+        <p:cNvPr id="1" name=""/>
+        <p:cNvGrpSpPr/>
+        <p:nvPr/>
+      </p:nvGrpSpPr>
+      <p:grpSpPr>
+        <a:xfrm>
+          <a:off x="0" y="0"/>
+          <a:ext cx="0" cy="0"/>
+          <a:chOff x="0" y="0"/>
+          <a:chExt cx="0" cy="0"/>
+        </a:xfrm>
+      </p:grpSpPr>
+      <p:sp>
+        <p:nvSpPr>
+          <p:cNvPr id="2" name="Slide Image Placeholder 1"/>
+          <p:cNvSpPr>
+            <a:spLocks noGrp="1" noRot="1" noChangeAspect="1"/>
+          </p:cNvSpPr>
+          <p:nvPr>
+            <p:ph type="sldImg"/>
+          </p:nvPr>
+        </p:nvSpPr>
+        <p:spPr/>
+      </p:sp>
+      <p:sp>
+        <p:nvSpPr>
+          <p:cNvPr id="3" name="Notes Placeholder 2"/>
+          <p:cNvSpPr>
+            <a:spLocks noGrp="1"/>
+          </p:cNvSpPr>
+          <p:nvPr>
+            <p:ph type="body" idx="1"/>
+          </p:nvPr>
+        </p:nvSpPr>
+        <p:spPr/>
+        <p:txBody>
+          <a:bodyPr/>
+          <a:lstStyle/>
+          <a:p>
+            <a:r>
+              <a:rPr lang="en-US" dirty="0"/>
+              <a:t>Create a VPC with a Public and Private subnet.  Create an EC2 in each of the Subnets.  The public EC2 should allow for SSH and inbound http traffic on 8000.  We will create a python web server to serve a page.</a:t>
+            </a:r>
+          </a:p>
+          <a:p>
+            <a:endParaRPr lang="en-US" dirty="0"/>
+          </a:p>
+          <a:p>
+            <a:r>
+              <a:rPr lang="en-US" dirty="0"/>
+              <a:t>The private subnet should create a security group that only allows the security group of the public subnet to </a:t>
+            </a:r>
+            <a:r>
+              <a:rPr lang="en-US" dirty="0" err="1"/>
+              <a:t>ssh</a:t>
+            </a:r>
+            <a:r>
+              <a:rPr lang="en-US" dirty="0"/>
+              <a:t>.  </a:t>
+            </a:r>
+          </a:p>
+          <a:p>
+            <a:endParaRPr lang="en-US" dirty="0"/>
+          </a:p>
+          <a:p>
+            <a:r>
+              <a:rPr lang="en-US" dirty="0"/>
+              <a:t>Create a </a:t>
+            </a:r>
+            <a:r>
+              <a:rPr lang="en-US" dirty="0" err="1"/>
+              <a:t>VPCEndpoint</a:t>
+            </a:r>
+            <a:r>
+              <a:rPr lang="en-US" dirty="0"/>
+              <a:t> for the private subnet to it can access S3.  Since the private subnet has no access to internet, it has to use </a:t>
+            </a:r>
+            <a:r>
+              <a:rPr lang="en-US" dirty="0" err="1"/>
+              <a:t>VPCEndpoint</a:t>
+            </a:r>
+            <a:r>
+              <a:rPr lang="en-US" dirty="0"/>
+              <a:t>.</a:t>
+            </a:r>
+          </a:p>
+          <a:p>
+            <a:endParaRPr lang="en-US" dirty="0"/>
+          </a:p>
+          <a:p>
+            <a:r>
+              <a:rPr lang="en-US" dirty="0"/>
+              <a:t>On EC2 in private subnet try:</a:t>
+            </a:r>
+          </a:p>
+          <a:p>
+            <a:r>
+              <a:rPr lang="en-US" dirty="0"/>
+              <a:t>Ping </a:t>
+            </a:r>
+            <a:r>
+              <a:rPr lang="en-US" dirty="0" err="1"/>
+              <a:t>google.com</a:t>
+            </a:r>
+            <a:endParaRPr lang="en-US" dirty="0"/>
+          </a:p>
+          <a:p>
+            <a:r>
+              <a:rPr lang="en-US" dirty="0"/>
+              <a:t>Should fail because there is no access to the internet</a:t>
+            </a:r>
+          </a:p>
+          <a:p>
+            <a:endParaRPr lang="en-US" dirty="0"/>
+          </a:p>
+          <a:p>
+            <a:r>
+              <a:rPr lang="en-US" dirty="0"/>
+              <a:t>Aws s3 ls</a:t>
+            </a:r>
+          </a:p>
+          <a:p>
+            <a:r>
+              <a:rPr lang="en-US" dirty="0"/>
+              <a:t>Should work because of the </a:t>
+            </a:r>
+            <a:r>
+              <a:rPr lang="en-US" dirty="0" err="1"/>
+              <a:t>VPCEndpoint</a:t>
+            </a:r>
+            <a:r>
+              <a:rPr lang="en-US" dirty="0"/>
+              <a:t> and the route table entry send S3 traffic on the AWS backbone, not on internet.</a:t>
+            </a:r>
+          </a:p>
+          <a:p>
+            <a:endParaRPr lang="en-US"/>
+          </a:p>
+          <a:p>
+            <a:endParaRPr lang="en-US" dirty="0"/>
+          </a:p>
+          <a:p>
+            <a:endParaRPr lang="en-US" dirty="0"/>
+          </a:p>
+          <a:p>
+            <a:endParaRPr lang="en-US" dirty="0"/>
+          </a:p>
+        </p:txBody>
+      </p:sp>
+      <p:sp>
+        <p:nvSpPr>
+          <p:cNvPr id="4" name="Slide Number Placeholder 3"/>
+          <p:cNvSpPr>
+            <a:spLocks noGrp="1"/>
+          </p:cNvSpPr>
+          <p:nvPr>
+            <p:ph type="sldNum" sz="quarter" idx="5"/>
+          </p:nvPr>
+        </p:nvSpPr>
+        <p:spPr/>
+        <p:txBody>
+          <a:bodyPr/>
+          <a:lstStyle/>
+          <a:p>
+            <a:fld id="{F0F304BD-78E5-F743-9CDB-4BAC0F2E5AB7}" type="slidenum">
+              <a:rPr lang="en-US" smtClean="0"/>
+              <a:t>5</a:t>
+            </a:fld>
+            <a:endParaRPr lang="en-US" dirty="0"/>
+          </a:p>
+        </p:txBody>
+      </p:sp>
+    </p:spTree>
+    <p:extLst>
+      <p:ext uri="{BB962C8B-B14F-4D97-AF65-F5344CB8AC3E}">
+        <p14:creationId xmlns:p14="http://schemas.microsoft.com/office/powerpoint/2010/main" val="4247643270"/>
       </p:ext>
     </p:extLst>
   </p:cSld>
@@ -19349,6 +19541,1777 @@
     <p:extLst>
       <p:ext uri="{BB962C8B-B14F-4D97-AF65-F5344CB8AC3E}">
         <p14:creationId xmlns:p14="http://schemas.microsoft.com/office/powerpoint/2010/main" val="2588998679"/>
+      </p:ext>
+    </p:extLst>
+  </p:cSld>
+  <p:clrMapOvr>
+    <a:masterClrMapping/>
+  </p:clrMapOvr>
+</p:sld>
+</file>
+
+<file path=ppt/slides/slide5.xml><?xml version="1.0" encoding="utf-8"?>
+<p:sld xmlns:a="http://schemas.openxmlformats.org/drawingml/2006/main" xmlns:r="http://schemas.openxmlformats.org/officeDocument/2006/relationships" xmlns:p="http://schemas.openxmlformats.org/presentationml/2006/main">
+  <p:cSld>
+    <p:spTree>
+      <p:nvGrpSpPr>
+        <p:cNvPr id="1" name=""/>
+        <p:cNvGrpSpPr/>
+        <p:nvPr/>
+      </p:nvGrpSpPr>
+      <p:grpSpPr>
+        <a:xfrm>
+          <a:off x="0" y="0"/>
+          <a:ext cx="0" cy="0"/>
+          <a:chOff x="0" y="0"/>
+          <a:chExt cx="0" cy="0"/>
+        </a:xfrm>
+      </p:grpSpPr>
+      <p:sp>
+        <p:nvSpPr>
+          <p:cNvPr id="30" name="Rectangle 29">
+            <a:extLst>
+              <a:ext uri="{FF2B5EF4-FFF2-40B4-BE49-F238E27FC236}">
+                <a16:creationId xmlns:a16="http://schemas.microsoft.com/office/drawing/2014/main" id="{7BDD16CE-648C-3648-96D9-5936775C39BA}"/>
+              </a:ext>
+            </a:extLst>
+          </p:cNvPr>
+          <p:cNvSpPr/>
+          <p:nvPr/>
+        </p:nvSpPr>
+        <p:spPr>
+          <a:xfrm>
+            <a:off x="9271032" y="2277911"/>
+            <a:ext cx="1765300" cy="2030218"/>
+          </a:xfrm>
+          <a:prstGeom prst="rect">
+            <a:avLst/>
+          </a:prstGeom>
+          <a:solidFill>
+            <a:srgbClr val="007CBC">
+              <a:alpha val="9804"/>
+            </a:srgbClr>
+          </a:solidFill>
+          <a:ln w="12700">
+            <a:noFill/>
+            <a:prstDash val="dash"/>
+          </a:ln>
+        </p:spPr>
+        <p:style>
+          <a:lnRef idx="2">
+            <a:schemeClr val="accent1">
+              <a:shade val="50000"/>
+            </a:schemeClr>
+          </a:lnRef>
+          <a:fillRef idx="1">
+            <a:schemeClr val="accent1"/>
+          </a:fillRef>
+          <a:effectRef idx="0">
+            <a:schemeClr val="accent1"/>
+          </a:effectRef>
+          <a:fontRef idx="minor">
+            <a:schemeClr val="lt1"/>
+          </a:fontRef>
+        </p:style>
+        <p:txBody>
+          <a:bodyPr rot="0" spcFirstLastPara="0" vertOverflow="overflow" horzOverflow="overflow" vert="horz" wrap="square" lIns="338328" tIns="45720" rIns="91440" bIns="45720" numCol="1" spcCol="0" rtlCol="0" fromWordArt="0" anchor="t" anchorCtr="0" forceAA="0" compatLnSpc="1">
+            <a:prstTxWarp prst="textNoShape">
+              <a:avLst/>
+            </a:prstTxWarp>
+            <a:noAutofit/>
+          </a:bodyPr>
+          <a:lstStyle/>
+          <a:p>
+            <a:pPr algn="l"/>
+            <a:r>
+              <a:rPr lang="en-US" sz="1200">
+                <a:solidFill>
+                  <a:schemeClr val="accent3"/>
+                </a:solidFill>
+              </a:rPr>
+              <a:t>Isolated </a:t>
+            </a:r>
+            <a:r>
+              <a:rPr lang="en-US" sz="1200" dirty="0">
+                <a:solidFill>
+                  <a:schemeClr val="accent3"/>
+                </a:solidFill>
+              </a:rPr>
+              <a:t>subnet</a:t>
+            </a:r>
+          </a:p>
+        </p:txBody>
+      </p:sp>
+      <p:sp>
+        <p:nvSpPr>
+          <p:cNvPr id="28" name="Rectangle 27">
+            <a:extLst>
+              <a:ext uri="{FF2B5EF4-FFF2-40B4-BE49-F238E27FC236}">
+                <a16:creationId xmlns:a16="http://schemas.microsoft.com/office/drawing/2014/main" id="{D5FE8F2D-EE09-F54E-9EE8-552653605A01}"/>
+              </a:ext>
+            </a:extLst>
+          </p:cNvPr>
+          <p:cNvSpPr/>
+          <p:nvPr/>
+        </p:nvSpPr>
+        <p:spPr>
+          <a:xfrm>
+            <a:off x="5943759" y="2441192"/>
+            <a:ext cx="1802421" cy="1886259"/>
+          </a:xfrm>
+          <a:prstGeom prst="rect">
+            <a:avLst/>
+          </a:prstGeom>
+          <a:solidFill>
+            <a:srgbClr val="1D8900">
+              <a:alpha val="9804"/>
+            </a:srgbClr>
+          </a:solidFill>
+          <a:ln w="12700">
+            <a:noFill/>
+            <a:prstDash val="dash"/>
+          </a:ln>
+        </p:spPr>
+        <p:style>
+          <a:lnRef idx="2">
+            <a:schemeClr val="accent1">
+              <a:shade val="50000"/>
+            </a:schemeClr>
+          </a:lnRef>
+          <a:fillRef idx="1">
+            <a:schemeClr val="accent1"/>
+          </a:fillRef>
+          <a:effectRef idx="0">
+            <a:schemeClr val="accent1"/>
+          </a:effectRef>
+          <a:fontRef idx="minor">
+            <a:schemeClr val="lt1"/>
+          </a:fontRef>
+        </p:style>
+        <p:txBody>
+          <a:bodyPr rot="0" spcFirstLastPara="0" vertOverflow="overflow" horzOverflow="overflow" vert="horz" wrap="square" lIns="338328" tIns="45720" rIns="91440" bIns="45720" numCol="1" spcCol="0" rtlCol="0" fromWordArt="0" anchor="t" anchorCtr="0" forceAA="0" compatLnSpc="1">
+            <a:prstTxWarp prst="textNoShape">
+              <a:avLst/>
+            </a:prstTxWarp>
+            <a:noAutofit/>
+          </a:bodyPr>
+          <a:lstStyle/>
+          <a:p>
+            <a:pPr algn="l"/>
+            <a:r>
+              <a:rPr lang="en-US" sz="1200" dirty="0">
+                <a:solidFill>
+                  <a:schemeClr val="accent5"/>
+                </a:solidFill>
+              </a:rPr>
+              <a:t>Public subnet</a:t>
+            </a:r>
+          </a:p>
+        </p:txBody>
+      </p:sp>
+      <p:sp>
+        <p:nvSpPr>
+          <p:cNvPr id="2" name="Title 1">
+            <a:extLst>
+              <a:ext uri="{FF2B5EF4-FFF2-40B4-BE49-F238E27FC236}">
+                <a16:creationId xmlns:a16="http://schemas.microsoft.com/office/drawing/2014/main" id="{CDDA9F02-0286-9D47-9B2F-9B10475E2D73}"/>
+              </a:ext>
+            </a:extLst>
+          </p:cNvPr>
+          <p:cNvSpPr>
+            <a:spLocks noGrp="1"/>
+          </p:cNvSpPr>
+          <p:nvPr>
+            <p:ph type="title"/>
+          </p:nvPr>
+        </p:nvSpPr>
+        <p:spPr/>
+        <p:txBody>
+          <a:bodyPr/>
+          <a:lstStyle/>
+          <a:p>
+            <a:r>
+              <a:rPr lang="en-US" dirty="0"/>
+              <a:t>AWS Networking</a:t>
+            </a:r>
+          </a:p>
+        </p:txBody>
+      </p:sp>
+      <p:sp>
+        <p:nvSpPr>
+          <p:cNvPr id="3" name="Slide Number Placeholder 2">
+            <a:extLst>
+              <a:ext uri="{FF2B5EF4-FFF2-40B4-BE49-F238E27FC236}">
+                <a16:creationId xmlns:a16="http://schemas.microsoft.com/office/drawing/2014/main" id="{E5B47438-E165-2A47-AAD2-0D8CFDFF44EF}"/>
+              </a:ext>
+            </a:extLst>
+          </p:cNvPr>
+          <p:cNvSpPr>
+            <a:spLocks noGrp="1"/>
+          </p:cNvSpPr>
+          <p:nvPr>
+            <p:ph type="sldNum" sz="quarter" idx="4"/>
+          </p:nvPr>
+        </p:nvSpPr>
+        <p:spPr/>
+        <p:txBody>
+          <a:bodyPr/>
+          <a:lstStyle/>
+          <a:p>
+            <a:fld id="{0E0E0192-C642-4D4F-AE82-A0D0DC02E26B}" type="slidenum">
+              <a:rPr lang="en-US" smtClean="0"/>
+              <a:t>5</a:t>
+            </a:fld>
+            <a:endParaRPr lang="en-US" dirty="0"/>
+          </a:p>
+        </p:txBody>
+      </p:sp>
+      <p:sp>
+        <p:nvSpPr>
+          <p:cNvPr id="7" name="Rectangle 6">
+            <a:extLst>
+              <a:ext uri="{FF2B5EF4-FFF2-40B4-BE49-F238E27FC236}">
+                <a16:creationId xmlns:a16="http://schemas.microsoft.com/office/drawing/2014/main" id="{CE4C6226-5624-E946-9D1F-F9581B9DC9B5}"/>
+              </a:ext>
+            </a:extLst>
+          </p:cNvPr>
+          <p:cNvSpPr/>
+          <p:nvPr/>
+        </p:nvSpPr>
+        <p:spPr>
+          <a:xfrm>
+            <a:off x="4082808" y="1108848"/>
+            <a:ext cx="7294028" cy="5335339"/>
+          </a:xfrm>
+          <a:prstGeom prst="rect">
+            <a:avLst/>
+          </a:prstGeom>
+          <a:noFill/>
+          <a:ln w="12700">
+            <a:solidFill>
+              <a:schemeClr val="tx1"/>
+            </a:solidFill>
+          </a:ln>
+        </p:spPr>
+        <p:style>
+          <a:lnRef idx="2">
+            <a:schemeClr val="accent1">
+              <a:shade val="50000"/>
+            </a:schemeClr>
+          </a:lnRef>
+          <a:fillRef idx="1">
+            <a:schemeClr val="accent1"/>
+          </a:fillRef>
+          <a:effectRef idx="0">
+            <a:schemeClr val="accent1"/>
+          </a:effectRef>
+          <a:fontRef idx="minor">
+            <a:schemeClr val="lt1"/>
+          </a:fontRef>
+        </p:style>
+        <p:txBody>
+          <a:bodyPr rot="0" spcFirstLastPara="0" vertOverflow="overflow" horzOverflow="overflow" vert="horz" wrap="square" lIns="457200" tIns="91440" rIns="91440" bIns="45720" numCol="1" spcCol="0" rtlCol="0" fromWordArt="0" anchor="t" anchorCtr="0" forceAA="0" compatLnSpc="1">
+            <a:prstTxWarp prst="textNoShape">
+              <a:avLst/>
+            </a:prstTxWarp>
+            <a:noAutofit/>
+          </a:bodyPr>
+          <a:lstStyle/>
+          <a:p>
+            <a:pPr algn="l"/>
+            <a:r>
+              <a:rPr lang="en-US" sz="1200" dirty="0">
+                <a:solidFill>
+                  <a:sysClr val="windowText" lastClr="000000"/>
+                </a:solidFill>
+              </a:rPr>
+              <a:t>AWS Cloud</a:t>
+            </a:r>
+          </a:p>
+        </p:txBody>
+      </p:sp>
+      <p:pic>
+        <p:nvPicPr>
+          <p:cNvPr id="13" name="Graphic 12">
+            <a:extLst>
+              <a:ext uri="{FF2B5EF4-FFF2-40B4-BE49-F238E27FC236}">
+                <a16:creationId xmlns:a16="http://schemas.microsoft.com/office/drawing/2014/main" id="{81BAC2F0-D04C-5546-88C9-FC54547008F3}"/>
+              </a:ext>
+            </a:extLst>
+          </p:cNvPr>
+          <p:cNvPicPr>
+            <a:picLocks noChangeAspect="1"/>
+          </p:cNvPicPr>
+          <p:nvPr/>
+        </p:nvPicPr>
+        <p:blipFill>
+          <a:blip r:embed="rId3">
+            <a:extLst>
+              <a:ext uri="{96DAC541-7B7A-43D3-8B79-37D633B846F1}">
+                <asvg:svgBlip xmlns:asvg="http://schemas.microsoft.com/office/drawing/2016/SVG/main" r:embed="rId4"/>
+              </a:ext>
+            </a:extLst>
+          </a:blip>
+          <a:stretch>
+            <a:fillRect/>
+          </a:stretch>
+        </p:blipFill>
+        <p:spPr>
+          <a:xfrm>
+            <a:off x="4093530" y="1108848"/>
+            <a:ext cx="330200" cy="330200"/>
+          </a:xfrm>
+          <a:prstGeom prst="rect">
+            <a:avLst/>
+          </a:prstGeom>
+        </p:spPr>
+      </p:pic>
+      <p:pic>
+        <p:nvPicPr>
+          <p:cNvPr id="31" name="Graphic 30">
+            <a:extLst>
+              <a:ext uri="{FF2B5EF4-FFF2-40B4-BE49-F238E27FC236}">
+                <a16:creationId xmlns:a16="http://schemas.microsoft.com/office/drawing/2014/main" id="{91E81628-D2C9-664A-8CDE-6C72D38EBC63}"/>
+              </a:ext>
+            </a:extLst>
+          </p:cNvPr>
+          <p:cNvPicPr>
+            <a:picLocks noChangeAspect="1"/>
+          </p:cNvPicPr>
+          <p:nvPr/>
+        </p:nvPicPr>
+        <p:blipFill>
+          <a:blip r:embed="rId5">
+            <a:extLst>
+              <a:ext uri="{96DAC541-7B7A-43D3-8B79-37D633B846F1}">
+                <asvg:svgBlip xmlns:asvg="http://schemas.microsoft.com/office/drawing/2016/SVG/main" r:embed="rId6"/>
+              </a:ext>
+            </a:extLst>
+          </a:blip>
+          <a:stretch>
+            <a:fillRect/>
+          </a:stretch>
+        </p:blipFill>
+        <p:spPr>
+          <a:xfrm>
+            <a:off x="3266276" y="3207294"/>
+            <a:ext cx="469900" cy="469900"/>
+          </a:xfrm>
+          <a:prstGeom prst="rect">
+            <a:avLst/>
+          </a:prstGeom>
+        </p:spPr>
+      </p:pic>
+      <p:pic>
+        <p:nvPicPr>
+          <p:cNvPr id="32" name="Graphic 31">
+            <a:extLst>
+              <a:ext uri="{FF2B5EF4-FFF2-40B4-BE49-F238E27FC236}">
+                <a16:creationId xmlns:a16="http://schemas.microsoft.com/office/drawing/2014/main" id="{1B679069-7917-E24C-B0AE-F9C9B98E9BDD}"/>
+              </a:ext>
+            </a:extLst>
+          </p:cNvPr>
+          <p:cNvPicPr>
+            <a:picLocks noChangeAspect="1"/>
+          </p:cNvPicPr>
+          <p:nvPr/>
+        </p:nvPicPr>
+        <p:blipFill>
+          <a:blip r:embed="rId7">
+            <a:extLst>
+              <a:ext uri="{96DAC541-7B7A-43D3-8B79-37D633B846F1}">
+                <asvg:svgBlip xmlns:asvg="http://schemas.microsoft.com/office/drawing/2016/SVG/main" r:embed="rId8"/>
+              </a:ext>
+            </a:extLst>
+          </a:blip>
+          <a:stretch>
+            <a:fillRect/>
+          </a:stretch>
+        </p:blipFill>
+        <p:spPr>
+          <a:xfrm>
+            <a:off x="1538542" y="3207294"/>
+            <a:ext cx="469900" cy="469900"/>
+          </a:xfrm>
+          <a:prstGeom prst="rect">
+            <a:avLst/>
+          </a:prstGeom>
+        </p:spPr>
+      </p:pic>
+      <p:cxnSp>
+        <p:nvCxnSpPr>
+          <p:cNvPr id="60" name="Straight Arrow Connector 59">
+            <a:extLst>
+              <a:ext uri="{FF2B5EF4-FFF2-40B4-BE49-F238E27FC236}">
+                <a16:creationId xmlns:a16="http://schemas.microsoft.com/office/drawing/2014/main" id="{39463C13-F087-3D47-82E8-A36EC782037F}"/>
+              </a:ext>
+            </a:extLst>
+          </p:cNvPr>
+          <p:cNvCxnSpPr>
+            <a:cxnSpLocks/>
+            <a:stCxn id="31" idx="1"/>
+            <a:endCxn id="32" idx="3"/>
+          </p:cNvCxnSpPr>
+          <p:nvPr/>
+        </p:nvCxnSpPr>
+        <p:spPr>
+          <a:xfrm flipH="1">
+            <a:off x="2008442" y="3442244"/>
+            <a:ext cx="1257834" cy="0"/>
+          </a:xfrm>
+          <a:prstGeom prst="straightConnector1">
+            <a:avLst/>
+          </a:prstGeom>
+          <a:ln w="12700">
+            <a:solidFill>
+              <a:srgbClr val="545B64"/>
+            </a:solidFill>
+            <a:headEnd type="arrow" w="med" len="sm"/>
+            <a:tailEnd type="none" w="med" len="sm"/>
+          </a:ln>
+        </p:spPr>
+        <p:style>
+          <a:lnRef idx="1">
+            <a:schemeClr val="accent1"/>
+          </a:lnRef>
+          <a:fillRef idx="0">
+            <a:schemeClr val="accent1"/>
+          </a:fillRef>
+          <a:effectRef idx="0">
+            <a:schemeClr val="accent1"/>
+          </a:effectRef>
+          <a:fontRef idx="minor">
+            <a:schemeClr val="tx1"/>
+          </a:fontRef>
+        </p:style>
+      </p:cxnSp>
+      <p:sp>
+        <p:nvSpPr>
+          <p:cNvPr id="69" name="TextBox 68">
+            <a:extLst>
+              <a:ext uri="{FF2B5EF4-FFF2-40B4-BE49-F238E27FC236}">
+                <a16:creationId xmlns:a16="http://schemas.microsoft.com/office/drawing/2014/main" id="{B067B607-102C-B145-A8AE-CA6BC861F4E9}"/>
+              </a:ext>
+            </a:extLst>
+          </p:cNvPr>
+          <p:cNvSpPr txBox="1"/>
+          <p:nvPr/>
+        </p:nvSpPr>
+        <p:spPr>
+          <a:xfrm>
+            <a:off x="1485593" y="3697114"/>
+            <a:ext cx="575799" cy="276999"/>
+          </a:xfrm>
+          <a:prstGeom prst="rect">
+            <a:avLst/>
+          </a:prstGeom>
+          <a:noFill/>
+        </p:spPr>
+        <p:txBody>
+          <a:bodyPr wrap="none" rtlCol="0">
+            <a:spAutoFit/>
+          </a:bodyPr>
+          <a:lstStyle/>
+          <a:p>
+            <a:r>
+              <a:rPr lang="en-US" sz="1200" dirty="0"/>
+              <a:t>Client</a:t>
+            </a:r>
+          </a:p>
+        </p:txBody>
+      </p:sp>
+      <p:sp>
+        <p:nvSpPr>
+          <p:cNvPr id="43" name="Rectangle 42">
+            <a:extLst>
+              <a:ext uri="{FF2B5EF4-FFF2-40B4-BE49-F238E27FC236}">
+                <a16:creationId xmlns:a16="http://schemas.microsoft.com/office/drawing/2014/main" id="{0009B9CE-6F2A-434A-8822-3CF8F31ECDCD}"/>
+              </a:ext>
+            </a:extLst>
+          </p:cNvPr>
+          <p:cNvSpPr/>
+          <p:nvPr/>
+        </p:nvSpPr>
+        <p:spPr>
+          <a:xfrm>
+            <a:off x="4912590" y="1428393"/>
+            <a:ext cx="6283234" cy="3542816"/>
+          </a:xfrm>
+          <a:prstGeom prst="rect">
+            <a:avLst/>
+          </a:prstGeom>
+          <a:noFill/>
+          <a:ln w="12700">
+            <a:solidFill>
+              <a:schemeClr val="accent5"/>
+            </a:solidFill>
+          </a:ln>
+        </p:spPr>
+        <p:style>
+          <a:lnRef idx="2">
+            <a:schemeClr val="accent1">
+              <a:shade val="50000"/>
+            </a:schemeClr>
+          </a:lnRef>
+          <a:fillRef idx="1">
+            <a:schemeClr val="accent1"/>
+          </a:fillRef>
+          <a:effectRef idx="0">
+            <a:schemeClr val="accent1"/>
+          </a:effectRef>
+          <a:fontRef idx="minor">
+            <a:schemeClr val="lt1"/>
+          </a:fontRef>
+        </p:style>
+        <p:txBody>
+          <a:bodyPr rot="0" spcFirstLastPara="0" vertOverflow="overflow" horzOverflow="overflow" vert="horz" wrap="square" lIns="457200" tIns="91440" rIns="91440" bIns="45720" numCol="1" spcCol="0" rtlCol="0" fromWordArt="0" anchor="t" anchorCtr="0" forceAA="0" compatLnSpc="1">
+            <a:prstTxWarp prst="textNoShape">
+              <a:avLst/>
+            </a:prstTxWarp>
+            <a:noAutofit/>
+          </a:bodyPr>
+          <a:lstStyle/>
+          <a:p>
+            <a:pPr algn="l"/>
+            <a:r>
+              <a:rPr lang="en-US" sz="1200" dirty="0">
+                <a:ln w="0"/>
+                <a:solidFill>
+                  <a:schemeClr val="accent5"/>
+                </a:solidFill>
+              </a:rPr>
+              <a:t>Application VPC</a:t>
+            </a:r>
+          </a:p>
+        </p:txBody>
+      </p:sp>
+      <p:pic>
+        <p:nvPicPr>
+          <p:cNvPr id="44" name="Graphic 43">
+            <a:extLst>
+              <a:ext uri="{FF2B5EF4-FFF2-40B4-BE49-F238E27FC236}">
+                <a16:creationId xmlns:a16="http://schemas.microsoft.com/office/drawing/2014/main" id="{A96626AE-D826-894C-8DDB-C14E10213DF6}"/>
+              </a:ext>
+            </a:extLst>
+          </p:cNvPr>
+          <p:cNvPicPr>
+            <a:picLocks noChangeAspect="1"/>
+          </p:cNvPicPr>
+          <p:nvPr/>
+        </p:nvPicPr>
+        <p:blipFill>
+          <a:blip r:embed="rId9">
+            <a:extLst>
+              <a:ext uri="{96DAC541-7B7A-43D3-8B79-37D633B846F1}">
+                <asvg:svgBlip xmlns:asvg="http://schemas.microsoft.com/office/drawing/2016/SVG/main" r:embed="rId10"/>
+              </a:ext>
+            </a:extLst>
+          </a:blip>
+          <a:stretch>
+            <a:fillRect/>
+          </a:stretch>
+        </p:blipFill>
+        <p:spPr>
+          <a:xfrm>
+            <a:off x="4912590" y="1431236"/>
+            <a:ext cx="364099" cy="376935"/>
+          </a:xfrm>
+          <a:prstGeom prst="rect">
+            <a:avLst/>
+          </a:prstGeom>
+        </p:spPr>
+      </p:pic>
+      <p:pic>
+        <p:nvPicPr>
+          <p:cNvPr id="57" name="Graphic 56">
+            <a:extLst>
+              <a:ext uri="{FF2B5EF4-FFF2-40B4-BE49-F238E27FC236}">
+                <a16:creationId xmlns:a16="http://schemas.microsoft.com/office/drawing/2014/main" id="{DCDA2ED5-F389-6F4D-AB41-51EAA20D0753}"/>
+              </a:ext>
+            </a:extLst>
+          </p:cNvPr>
+          <p:cNvPicPr>
+            <a:picLocks noChangeAspect="1"/>
+          </p:cNvPicPr>
+          <p:nvPr/>
+        </p:nvPicPr>
+        <p:blipFill>
+          <a:blip r:embed="rId11">
+            <a:extLst>
+              <a:ext uri="{96DAC541-7B7A-43D3-8B79-37D633B846F1}">
+                <asvg:svgBlip xmlns:asvg="http://schemas.microsoft.com/office/drawing/2016/SVG/main" r:embed="rId12"/>
+              </a:ext>
+            </a:extLst>
+          </a:blip>
+          <a:stretch>
+            <a:fillRect/>
+          </a:stretch>
+        </p:blipFill>
+        <p:spPr>
+          <a:xfrm>
+            <a:off x="6349253" y="3002054"/>
+            <a:ext cx="711200" cy="711200"/>
+          </a:xfrm>
+          <a:prstGeom prst="rect">
+            <a:avLst/>
+          </a:prstGeom>
+        </p:spPr>
+      </p:pic>
+      <p:pic>
+        <p:nvPicPr>
+          <p:cNvPr id="58" name="Graphic 57">
+            <a:extLst>
+              <a:ext uri="{FF2B5EF4-FFF2-40B4-BE49-F238E27FC236}">
+                <a16:creationId xmlns:a16="http://schemas.microsoft.com/office/drawing/2014/main" id="{038A80DA-5DD8-9F42-9358-3F000E8CE26F}"/>
+              </a:ext>
+            </a:extLst>
+          </p:cNvPr>
+          <p:cNvPicPr>
+            <a:picLocks noChangeAspect="1"/>
+          </p:cNvPicPr>
+          <p:nvPr/>
+        </p:nvPicPr>
+        <p:blipFill>
+          <a:blip r:embed="rId11">
+            <a:extLst>
+              <a:ext uri="{96DAC541-7B7A-43D3-8B79-37D633B846F1}">
+                <asvg:svgBlip xmlns:asvg="http://schemas.microsoft.com/office/drawing/2016/SVG/main" r:embed="rId12"/>
+              </a:ext>
+            </a:extLst>
+          </a:blip>
+          <a:stretch>
+            <a:fillRect/>
+          </a:stretch>
+        </p:blipFill>
+        <p:spPr>
+          <a:xfrm>
+            <a:off x="9764955" y="2853301"/>
+            <a:ext cx="711200" cy="711200"/>
+          </a:xfrm>
+          <a:prstGeom prst="rect">
+            <a:avLst/>
+          </a:prstGeom>
+        </p:spPr>
+      </p:pic>
+      <p:cxnSp>
+        <p:nvCxnSpPr>
+          <p:cNvPr id="63" name="Straight Arrow Connector 62">
+            <a:extLst>
+              <a:ext uri="{FF2B5EF4-FFF2-40B4-BE49-F238E27FC236}">
+                <a16:creationId xmlns:a16="http://schemas.microsoft.com/office/drawing/2014/main" id="{EFC947D9-5064-F245-B84D-14816D0585D9}"/>
+              </a:ext>
+            </a:extLst>
+          </p:cNvPr>
+          <p:cNvCxnSpPr>
+            <a:cxnSpLocks/>
+            <a:stCxn id="42" idx="0"/>
+            <a:endCxn id="55" idx="2"/>
+          </p:cNvCxnSpPr>
+          <p:nvPr/>
+        </p:nvCxnSpPr>
+        <p:spPr>
+          <a:xfrm flipV="1">
+            <a:off x="9585596" y="4086345"/>
+            <a:ext cx="528135" cy="707236"/>
+          </a:xfrm>
+          <a:prstGeom prst="straightConnector1">
+            <a:avLst/>
+          </a:prstGeom>
+          <a:ln w="12700">
+            <a:solidFill>
+              <a:srgbClr val="545B64"/>
+            </a:solidFill>
+            <a:headEnd type="arrow" w="med" len="sm"/>
+            <a:tailEnd type="none" w="med" len="sm"/>
+          </a:ln>
+        </p:spPr>
+        <p:style>
+          <a:lnRef idx="1">
+            <a:schemeClr val="accent1"/>
+          </a:lnRef>
+          <a:fillRef idx="0">
+            <a:schemeClr val="accent1"/>
+          </a:fillRef>
+          <a:effectRef idx="0">
+            <a:schemeClr val="accent1"/>
+          </a:effectRef>
+          <a:fontRef idx="minor">
+            <a:schemeClr val="tx1"/>
+          </a:fontRef>
+        </p:style>
+      </p:cxnSp>
+      <p:cxnSp>
+        <p:nvCxnSpPr>
+          <p:cNvPr id="64" name="Straight Arrow Connector 63">
+            <a:extLst>
+              <a:ext uri="{FF2B5EF4-FFF2-40B4-BE49-F238E27FC236}">
+                <a16:creationId xmlns:a16="http://schemas.microsoft.com/office/drawing/2014/main" id="{D478E7C7-5268-A940-9D15-EDDFCE3E67F5}"/>
+              </a:ext>
+            </a:extLst>
+          </p:cNvPr>
+          <p:cNvCxnSpPr>
+            <a:cxnSpLocks/>
+            <a:stCxn id="48" idx="1"/>
+          </p:cNvCxnSpPr>
+          <p:nvPr/>
+        </p:nvCxnSpPr>
+        <p:spPr>
+          <a:xfrm flipH="1">
+            <a:off x="7306930" y="3068809"/>
+            <a:ext cx="2162266" cy="135557"/>
+          </a:xfrm>
+          <a:prstGeom prst="straightConnector1">
+            <a:avLst/>
+          </a:prstGeom>
+          <a:ln w="12700">
+            <a:solidFill>
+              <a:srgbClr val="545B64"/>
+            </a:solidFill>
+            <a:headEnd type="arrow" w="med" len="sm"/>
+            <a:tailEnd type="none" w="med" len="sm"/>
+          </a:ln>
+        </p:spPr>
+        <p:style>
+          <a:lnRef idx="1">
+            <a:schemeClr val="accent1"/>
+          </a:lnRef>
+          <a:fillRef idx="0">
+            <a:schemeClr val="accent1"/>
+          </a:fillRef>
+          <a:effectRef idx="0">
+            <a:schemeClr val="accent1"/>
+          </a:effectRef>
+          <a:fontRef idx="minor">
+            <a:schemeClr val="tx1"/>
+          </a:fontRef>
+        </p:style>
+      </p:cxnSp>
+      <p:cxnSp>
+        <p:nvCxnSpPr>
+          <p:cNvPr id="68" name="Straight Arrow Connector 67">
+            <a:extLst>
+              <a:ext uri="{FF2B5EF4-FFF2-40B4-BE49-F238E27FC236}">
+                <a16:creationId xmlns:a16="http://schemas.microsoft.com/office/drawing/2014/main" id="{0253AD0D-051A-1B47-8320-B20A3F92BE1E}"/>
+              </a:ext>
+            </a:extLst>
+          </p:cNvPr>
+          <p:cNvCxnSpPr>
+            <a:cxnSpLocks/>
+            <a:stCxn id="45" idx="3"/>
+            <a:endCxn id="42" idx="1"/>
+          </p:cNvCxnSpPr>
+          <p:nvPr/>
+        </p:nvCxnSpPr>
+        <p:spPr>
+          <a:xfrm flipV="1">
+            <a:off x="7851203" y="5028531"/>
+            <a:ext cx="1499443" cy="604108"/>
+          </a:xfrm>
+          <a:prstGeom prst="straightConnector1">
+            <a:avLst/>
+          </a:prstGeom>
+          <a:ln w="12700">
+            <a:solidFill>
+              <a:srgbClr val="545B64"/>
+            </a:solidFill>
+            <a:headEnd type="arrow" w="med" len="sm"/>
+            <a:tailEnd type="none" w="med" len="sm"/>
+          </a:ln>
+        </p:spPr>
+        <p:style>
+          <a:lnRef idx="1">
+            <a:schemeClr val="accent1"/>
+          </a:lnRef>
+          <a:fillRef idx="0">
+            <a:schemeClr val="accent1"/>
+          </a:fillRef>
+          <a:effectRef idx="0">
+            <a:schemeClr val="accent1"/>
+          </a:effectRef>
+          <a:fontRef idx="minor">
+            <a:schemeClr val="tx1"/>
+          </a:fontRef>
+        </p:style>
+      </p:cxnSp>
+      <p:cxnSp>
+        <p:nvCxnSpPr>
+          <p:cNvPr id="74" name="Straight Arrow Connector 73">
+            <a:extLst>
+              <a:ext uri="{FF2B5EF4-FFF2-40B4-BE49-F238E27FC236}">
+                <a16:creationId xmlns:a16="http://schemas.microsoft.com/office/drawing/2014/main" id="{8C7D18C0-F102-8945-9FD0-E4E9A32AA953}"/>
+              </a:ext>
+            </a:extLst>
+          </p:cNvPr>
+          <p:cNvCxnSpPr>
+            <a:cxnSpLocks/>
+            <a:stCxn id="35" idx="1"/>
+            <a:endCxn id="31" idx="3"/>
+          </p:cNvCxnSpPr>
+          <p:nvPr/>
+        </p:nvCxnSpPr>
+        <p:spPr>
+          <a:xfrm flipH="1">
+            <a:off x="3736176" y="3439316"/>
+            <a:ext cx="959615" cy="2928"/>
+          </a:xfrm>
+          <a:prstGeom prst="straightConnector1">
+            <a:avLst/>
+          </a:prstGeom>
+          <a:ln w="12700">
+            <a:solidFill>
+              <a:srgbClr val="545B64"/>
+            </a:solidFill>
+            <a:headEnd type="arrow" w="med" len="sm"/>
+            <a:tailEnd type="none" w="med" len="sm"/>
+          </a:ln>
+        </p:spPr>
+        <p:style>
+          <a:lnRef idx="1">
+            <a:schemeClr val="accent1"/>
+          </a:lnRef>
+          <a:fillRef idx="0">
+            <a:schemeClr val="accent1"/>
+          </a:fillRef>
+          <a:effectRef idx="0">
+            <a:schemeClr val="accent1"/>
+          </a:effectRef>
+          <a:fontRef idx="minor">
+            <a:schemeClr val="tx1"/>
+          </a:fontRef>
+        </p:style>
+      </p:cxnSp>
+      <p:sp>
+        <p:nvSpPr>
+          <p:cNvPr id="75" name="TextBox 74">
+            <a:extLst>
+              <a:ext uri="{FF2B5EF4-FFF2-40B4-BE49-F238E27FC236}">
+                <a16:creationId xmlns:a16="http://schemas.microsoft.com/office/drawing/2014/main" id="{F51B9253-69BA-0746-99A9-881C6995A19D}"/>
+              </a:ext>
+            </a:extLst>
+          </p:cNvPr>
+          <p:cNvSpPr txBox="1"/>
+          <p:nvPr/>
+        </p:nvSpPr>
+        <p:spPr>
+          <a:xfrm>
+            <a:off x="3199263" y="3646622"/>
+            <a:ext cx="705642" cy="276999"/>
+          </a:xfrm>
+          <a:prstGeom prst="rect">
+            <a:avLst/>
+          </a:prstGeom>
+          <a:noFill/>
+        </p:spPr>
+        <p:txBody>
+          <a:bodyPr wrap="none" rtlCol="0">
+            <a:spAutoFit/>
+          </a:bodyPr>
+          <a:lstStyle/>
+          <a:p>
+            <a:r>
+              <a:rPr lang="en-US" sz="1200" dirty="0"/>
+              <a:t>Internet</a:t>
+            </a:r>
+          </a:p>
+        </p:txBody>
+      </p:sp>
+      <p:sp>
+        <p:nvSpPr>
+          <p:cNvPr id="78" name="TextBox 77">
+            <a:extLst>
+              <a:ext uri="{FF2B5EF4-FFF2-40B4-BE49-F238E27FC236}">
+                <a16:creationId xmlns:a16="http://schemas.microsoft.com/office/drawing/2014/main" id="{54CBA5F2-C770-2144-9E19-33590465E4F1}"/>
+              </a:ext>
+            </a:extLst>
+          </p:cNvPr>
+          <p:cNvSpPr txBox="1"/>
+          <p:nvPr/>
+        </p:nvSpPr>
+        <p:spPr>
+          <a:xfrm>
+            <a:off x="1110490" y="4012285"/>
+            <a:ext cx="1326004" cy="461665"/>
+          </a:xfrm>
+          <a:prstGeom prst="rect">
+            <a:avLst/>
+          </a:prstGeom>
+          <a:noFill/>
+        </p:spPr>
+        <p:txBody>
+          <a:bodyPr wrap="none" rtlCol="0">
+            <a:spAutoFit/>
+          </a:bodyPr>
+          <a:lstStyle/>
+          <a:p>
+            <a:r>
+              <a:rPr lang="en-US" sz="1200" dirty="0"/>
+              <a:t>Load Generation</a:t>
+            </a:r>
+          </a:p>
+          <a:p>
+            <a:r>
+              <a:rPr lang="en-US" sz="1200" dirty="0"/>
+              <a:t>Script</a:t>
+            </a:r>
+          </a:p>
+        </p:txBody>
+      </p:sp>
+      <p:pic>
+        <p:nvPicPr>
+          <p:cNvPr id="29" name="Graphic 28">
+            <a:extLst>
+              <a:ext uri="{FF2B5EF4-FFF2-40B4-BE49-F238E27FC236}">
+                <a16:creationId xmlns:a16="http://schemas.microsoft.com/office/drawing/2014/main" id="{D696A697-7D2C-F643-BE1F-F6680DA13559}"/>
+              </a:ext>
+            </a:extLst>
+          </p:cNvPr>
+          <p:cNvPicPr>
+            <a:picLocks noChangeAspect="1"/>
+          </p:cNvPicPr>
+          <p:nvPr/>
+        </p:nvPicPr>
+        <p:blipFill>
+          <a:blip r:embed="rId13">
+            <a:extLst>
+              <a:ext uri="{96DAC541-7B7A-43D3-8B79-37D633B846F1}">
+                <asvg:svgBlip xmlns:asvg="http://schemas.microsoft.com/office/drawing/2016/SVG/main" r:embed="rId14"/>
+              </a:ext>
+            </a:extLst>
+          </a:blip>
+          <a:stretch>
+            <a:fillRect/>
+          </a:stretch>
+        </p:blipFill>
+        <p:spPr>
+          <a:xfrm>
+            <a:off x="5943759" y="2439731"/>
+            <a:ext cx="274320" cy="274320"/>
+          </a:xfrm>
+          <a:prstGeom prst="rect">
+            <a:avLst/>
+          </a:prstGeom>
+        </p:spPr>
+      </p:pic>
+      <p:pic>
+        <p:nvPicPr>
+          <p:cNvPr id="33" name="Graphic 32">
+            <a:extLst>
+              <a:ext uri="{FF2B5EF4-FFF2-40B4-BE49-F238E27FC236}">
+                <a16:creationId xmlns:a16="http://schemas.microsoft.com/office/drawing/2014/main" id="{59202DCE-41EB-2A45-B01E-A9FF7A1F42CA}"/>
+              </a:ext>
+            </a:extLst>
+          </p:cNvPr>
+          <p:cNvPicPr>
+            <a:picLocks noChangeAspect="1"/>
+          </p:cNvPicPr>
+          <p:nvPr/>
+        </p:nvPicPr>
+        <p:blipFill>
+          <a:blip r:embed="rId15">
+            <a:extLst>
+              <a:ext uri="{96DAC541-7B7A-43D3-8B79-37D633B846F1}">
+                <asvg:svgBlip xmlns:asvg="http://schemas.microsoft.com/office/drawing/2016/SVG/main" r:embed="rId16"/>
+              </a:ext>
+            </a:extLst>
+          </a:blip>
+          <a:stretch>
+            <a:fillRect/>
+          </a:stretch>
+        </p:blipFill>
+        <p:spPr>
+          <a:xfrm>
+            <a:off x="9271032" y="2275552"/>
+            <a:ext cx="274320" cy="274320"/>
+          </a:xfrm>
+          <a:prstGeom prst="rect">
+            <a:avLst/>
+          </a:prstGeom>
+        </p:spPr>
+      </p:pic>
+      <p:grpSp>
+        <p:nvGrpSpPr>
+          <p:cNvPr id="4" name="Group 3">
+            <a:extLst>
+              <a:ext uri="{FF2B5EF4-FFF2-40B4-BE49-F238E27FC236}">
+                <a16:creationId xmlns:a16="http://schemas.microsoft.com/office/drawing/2014/main" id="{D7386DDF-F994-814F-809B-25B710816C20}"/>
+              </a:ext>
+            </a:extLst>
+          </p:cNvPr>
+          <p:cNvGrpSpPr/>
+          <p:nvPr/>
+        </p:nvGrpSpPr>
+        <p:grpSpPr>
+          <a:xfrm>
+            <a:off x="4046206" y="3204366"/>
+            <a:ext cx="1769070" cy="712066"/>
+            <a:chOff x="165579" y="4863449"/>
+            <a:chExt cx="1769070" cy="712066"/>
+          </a:xfrm>
+        </p:grpSpPr>
+        <p:sp>
+          <p:nvSpPr>
+            <p:cNvPr id="34" name="TextBox 33">
+              <a:extLst>
+                <a:ext uri="{FF2B5EF4-FFF2-40B4-BE49-F238E27FC236}">
+                  <a16:creationId xmlns:a16="http://schemas.microsoft.com/office/drawing/2014/main" id="{C421BE6D-86AF-AF47-BDCB-2724FA845A87}"/>
+                </a:ext>
+              </a:extLst>
+            </p:cNvPr>
+            <p:cNvSpPr txBox="1"/>
+            <p:nvPr/>
+          </p:nvSpPr>
+          <p:spPr>
+            <a:xfrm>
+              <a:off x="165579" y="5298516"/>
+              <a:ext cx="1769070" cy="276999"/>
+            </a:xfrm>
+            <a:prstGeom prst="rect">
+              <a:avLst/>
+            </a:prstGeom>
+            <a:noFill/>
+          </p:spPr>
+          <p:txBody>
+            <a:bodyPr wrap="square" rtlCol="0">
+              <a:spAutoFit/>
+            </a:bodyPr>
+            <a:lstStyle/>
+            <a:p>
+              <a:pPr algn="ctr"/>
+              <a:r>
+                <a:rPr lang="en-US" sz="1200" dirty="0"/>
+                <a:t>Internet gateway</a:t>
+              </a:r>
+            </a:p>
+          </p:txBody>
+        </p:sp>
+        <p:pic>
+          <p:nvPicPr>
+            <p:cNvPr id="35" name="Graphic 34">
+              <a:extLst>
+                <a:ext uri="{FF2B5EF4-FFF2-40B4-BE49-F238E27FC236}">
+                  <a16:creationId xmlns:a16="http://schemas.microsoft.com/office/drawing/2014/main" id="{0562A99A-DAD6-EC4E-AFBA-0296C46FCEC1}"/>
+                </a:ext>
+              </a:extLst>
+            </p:cNvPr>
+            <p:cNvPicPr>
+              <a:picLocks noChangeAspect="1"/>
+            </p:cNvPicPr>
+            <p:nvPr/>
+          </p:nvPicPr>
+          <p:blipFill>
+            <a:blip r:embed="rId17">
+              <a:extLst>
+                <a:ext uri="{96DAC541-7B7A-43D3-8B79-37D633B846F1}">
+                  <asvg:svgBlip xmlns:asvg="http://schemas.microsoft.com/office/drawing/2016/SVG/main" r:embed="rId18"/>
+                </a:ext>
+              </a:extLst>
+            </a:blip>
+            <a:stretch>
+              <a:fillRect/>
+            </a:stretch>
+          </p:blipFill>
+          <p:spPr>
+            <a:xfrm>
+              <a:off x="815164" y="4863449"/>
+              <a:ext cx="469900" cy="469900"/>
+            </a:xfrm>
+            <a:prstGeom prst="rect">
+              <a:avLst/>
+            </a:prstGeom>
+          </p:spPr>
+        </p:pic>
+      </p:grpSp>
+      <p:sp>
+        <p:nvSpPr>
+          <p:cNvPr id="38" name="Rectangle 37">
+            <a:extLst>
+              <a:ext uri="{FF2B5EF4-FFF2-40B4-BE49-F238E27FC236}">
+                <a16:creationId xmlns:a16="http://schemas.microsoft.com/office/drawing/2014/main" id="{B274A428-8685-874A-AEE4-B21752BFD277}"/>
+              </a:ext>
+            </a:extLst>
+          </p:cNvPr>
+          <p:cNvSpPr/>
+          <p:nvPr/>
+        </p:nvSpPr>
+        <p:spPr>
+          <a:xfrm>
+            <a:off x="5828606" y="2105964"/>
+            <a:ext cx="2061035" cy="2367985"/>
+          </a:xfrm>
+          <a:prstGeom prst="rect">
+            <a:avLst/>
+          </a:prstGeom>
+          <a:noFill/>
+          <a:ln w="12700">
+            <a:solidFill>
+              <a:schemeClr val="accent3"/>
+            </a:solidFill>
+            <a:prstDash val="dash"/>
+          </a:ln>
+        </p:spPr>
+        <p:style>
+          <a:lnRef idx="2">
+            <a:schemeClr val="accent1">
+              <a:shade val="50000"/>
+            </a:schemeClr>
+          </a:lnRef>
+          <a:fillRef idx="1">
+            <a:schemeClr val="accent1"/>
+          </a:fillRef>
+          <a:effectRef idx="0">
+            <a:schemeClr val="accent1"/>
+          </a:effectRef>
+          <a:fontRef idx="minor">
+            <a:schemeClr val="lt1"/>
+          </a:fontRef>
+        </p:style>
+        <p:txBody>
+          <a:bodyPr rot="0" spcFirstLastPara="0" vertOverflow="overflow" horzOverflow="overflow" vert="horz" wrap="square" lIns="91440" tIns="91440" rIns="91440" bIns="45720" numCol="1" spcCol="0" rtlCol="0" fromWordArt="0" anchor="t" anchorCtr="0" forceAA="0" compatLnSpc="1">
+            <a:prstTxWarp prst="textNoShape">
+              <a:avLst/>
+            </a:prstTxWarp>
+            <a:noAutofit/>
+          </a:bodyPr>
+          <a:lstStyle/>
+          <a:p>
+            <a:pPr algn="ctr"/>
+            <a:r>
+              <a:rPr lang="en-US" sz="1200" dirty="0">
+                <a:solidFill>
+                  <a:schemeClr val="accent3"/>
+                </a:solidFill>
+              </a:rPr>
+              <a:t>Availability Zone 1</a:t>
+            </a:r>
+          </a:p>
+        </p:txBody>
+      </p:sp>
+      <p:sp>
+        <p:nvSpPr>
+          <p:cNvPr id="40" name="Rectangle 39">
+            <a:extLst>
+              <a:ext uri="{FF2B5EF4-FFF2-40B4-BE49-F238E27FC236}">
+                <a16:creationId xmlns:a16="http://schemas.microsoft.com/office/drawing/2014/main" id="{A4BC12B9-AD77-244E-89F0-B0B4A9BB4239}"/>
+              </a:ext>
+            </a:extLst>
+          </p:cNvPr>
+          <p:cNvSpPr/>
+          <p:nvPr/>
+        </p:nvSpPr>
+        <p:spPr>
+          <a:xfrm>
+            <a:off x="9240022" y="1902503"/>
+            <a:ext cx="1761066" cy="2571445"/>
+          </a:xfrm>
+          <a:prstGeom prst="rect">
+            <a:avLst/>
+          </a:prstGeom>
+          <a:noFill/>
+          <a:ln w="12700">
+            <a:solidFill>
+              <a:schemeClr val="accent3"/>
+            </a:solidFill>
+            <a:prstDash val="dash"/>
+          </a:ln>
+        </p:spPr>
+        <p:style>
+          <a:lnRef idx="2">
+            <a:schemeClr val="accent1">
+              <a:shade val="50000"/>
+            </a:schemeClr>
+          </a:lnRef>
+          <a:fillRef idx="1">
+            <a:schemeClr val="accent1"/>
+          </a:fillRef>
+          <a:effectRef idx="0">
+            <a:schemeClr val="accent1"/>
+          </a:effectRef>
+          <a:fontRef idx="minor">
+            <a:schemeClr val="lt1"/>
+          </a:fontRef>
+        </p:style>
+        <p:txBody>
+          <a:bodyPr rot="0" spcFirstLastPara="0" vertOverflow="overflow" horzOverflow="overflow" vert="horz" wrap="square" lIns="91440" tIns="91440" rIns="91440" bIns="45720" numCol="1" spcCol="0" rtlCol="0" fromWordArt="0" anchor="t" anchorCtr="0" forceAA="0" compatLnSpc="1">
+            <a:prstTxWarp prst="textNoShape">
+              <a:avLst/>
+            </a:prstTxWarp>
+            <a:noAutofit/>
+          </a:bodyPr>
+          <a:lstStyle/>
+          <a:p>
+            <a:pPr algn="ctr"/>
+            <a:r>
+              <a:rPr lang="en-US" sz="1200" dirty="0">
+                <a:solidFill>
+                  <a:schemeClr val="accent3"/>
+                </a:solidFill>
+              </a:rPr>
+              <a:t>Availability Zone 2</a:t>
+            </a:r>
+          </a:p>
+        </p:txBody>
+      </p:sp>
+      <p:sp>
+        <p:nvSpPr>
+          <p:cNvPr id="41" name="TextBox 40">
+            <a:extLst>
+              <a:ext uri="{FF2B5EF4-FFF2-40B4-BE49-F238E27FC236}">
+                <a16:creationId xmlns:a16="http://schemas.microsoft.com/office/drawing/2014/main" id="{64B4A599-DAF8-CA43-AD48-F9F5F74F7DFD}"/>
+              </a:ext>
+            </a:extLst>
+          </p:cNvPr>
+          <p:cNvSpPr txBox="1"/>
+          <p:nvPr/>
+        </p:nvSpPr>
+        <p:spPr>
+          <a:xfrm>
+            <a:off x="8955769" y="5259163"/>
+            <a:ext cx="1259655" cy="307777"/>
+          </a:xfrm>
+          <a:prstGeom prst="rect">
+            <a:avLst/>
+          </a:prstGeom>
+          <a:noFill/>
+        </p:spPr>
+        <p:txBody>
+          <a:bodyPr wrap="square" rtlCol="0">
+            <a:spAutoFit/>
+          </a:bodyPr>
+          <a:lstStyle/>
+          <a:p>
+            <a:pPr algn="ctr"/>
+            <a:r>
+              <a:rPr lang="en-US" sz="1400" dirty="0"/>
+              <a:t>Endpoints</a:t>
+            </a:r>
+          </a:p>
+        </p:txBody>
+      </p:sp>
+      <p:pic>
+        <p:nvPicPr>
+          <p:cNvPr id="42" name="Graphic 41">
+            <a:extLst>
+              <a:ext uri="{FF2B5EF4-FFF2-40B4-BE49-F238E27FC236}">
+                <a16:creationId xmlns:a16="http://schemas.microsoft.com/office/drawing/2014/main" id="{122A8A8D-0D22-DA46-AF69-661CAC3D2C4F}"/>
+              </a:ext>
+            </a:extLst>
+          </p:cNvPr>
+          <p:cNvPicPr>
+            <a:picLocks noChangeAspect="1"/>
+          </p:cNvPicPr>
+          <p:nvPr/>
+        </p:nvPicPr>
+        <p:blipFill>
+          <a:blip r:embed="rId19">
+            <a:extLst>
+              <a:ext uri="{96DAC541-7B7A-43D3-8B79-37D633B846F1}">
+                <asvg:svgBlip xmlns:asvg="http://schemas.microsoft.com/office/drawing/2016/SVG/main" r:embed="rId20"/>
+              </a:ext>
+            </a:extLst>
+          </a:blip>
+          <a:stretch>
+            <a:fillRect/>
+          </a:stretch>
+        </p:blipFill>
+        <p:spPr>
+          <a:xfrm>
+            <a:off x="9350646" y="4793581"/>
+            <a:ext cx="469900" cy="469900"/>
+          </a:xfrm>
+          <a:prstGeom prst="rect">
+            <a:avLst/>
+          </a:prstGeom>
+        </p:spPr>
+      </p:pic>
+      <p:pic>
+        <p:nvPicPr>
+          <p:cNvPr id="45" name="Graphic 44">
+            <a:extLst>
+              <a:ext uri="{FF2B5EF4-FFF2-40B4-BE49-F238E27FC236}">
+                <a16:creationId xmlns:a16="http://schemas.microsoft.com/office/drawing/2014/main" id="{E724704C-FAC4-164D-87F8-862CE06D897C}"/>
+              </a:ext>
+            </a:extLst>
+          </p:cNvPr>
+          <p:cNvPicPr>
+            <a:picLocks noChangeAspect="1"/>
+          </p:cNvPicPr>
+          <p:nvPr/>
+        </p:nvPicPr>
+        <p:blipFill>
+          <a:blip r:embed="rId21">
+            <a:extLst>
+              <a:ext uri="{96DAC541-7B7A-43D3-8B79-37D633B846F1}">
+                <asvg:svgBlip xmlns:asvg="http://schemas.microsoft.com/office/drawing/2016/SVG/main" r:embed="rId22"/>
+              </a:ext>
+            </a:extLst>
+          </a:blip>
+          <a:stretch>
+            <a:fillRect/>
+          </a:stretch>
+        </p:blipFill>
+        <p:spPr>
+          <a:xfrm>
+            <a:off x="7309663" y="5361869"/>
+            <a:ext cx="541540" cy="541540"/>
+          </a:xfrm>
+          <a:prstGeom prst="rect">
+            <a:avLst/>
+          </a:prstGeom>
+        </p:spPr>
+      </p:pic>
+      <p:sp>
+        <p:nvSpPr>
+          <p:cNvPr id="46" name="TextBox 45">
+            <a:extLst>
+              <a:ext uri="{FF2B5EF4-FFF2-40B4-BE49-F238E27FC236}">
+                <a16:creationId xmlns:a16="http://schemas.microsoft.com/office/drawing/2014/main" id="{51B88D39-4AE8-E844-B8A3-6CC49FB5A1E3}"/>
+              </a:ext>
+            </a:extLst>
+          </p:cNvPr>
+          <p:cNvSpPr txBox="1"/>
+          <p:nvPr/>
+        </p:nvSpPr>
+        <p:spPr>
+          <a:xfrm>
+            <a:off x="6799491" y="5912188"/>
+            <a:ext cx="1604177" cy="523220"/>
+          </a:xfrm>
+          <a:prstGeom prst="rect">
+            <a:avLst/>
+          </a:prstGeom>
+          <a:noFill/>
+        </p:spPr>
+        <p:txBody>
+          <a:bodyPr wrap="square" rtlCol="0">
+            <a:spAutoFit/>
+          </a:bodyPr>
+          <a:lstStyle/>
+          <a:p>
+            <a:pPr algn="ctr"/>
+            <a:r>
+              <a:rPr lang="en-US" sz="1400" dirty="0"/>
+              <a:t>Amazon Simple Storage Service</a:t>
+            </a:r>
+          </a:p>
+        </p:txBody>
+      </p:sp>
+      <p:sp>
+        <p:nvSpPr>
+          <p:cNvPr id="47" name="Rectangle 46">
+            <a:extLst>
+              <a:ext uri="{FF2B5EF4-FFF2-40B4-BE49-F238E27FC236}">
+                <a16:creationId xmlns:a16="http://schemas.microsoft.com/office/drawing/2014/main" id="{F50590E7-A511-3543-83F4-CA0D6208FD5E}"/>
+              </a:ext>
+            </a:extLst>
+          </p:cNvPr>
+          <p:cNvSpPr/>
+          <p:nvPr/>
+        </p:nvSpPr>
+        <p:spPr>
+          <a:xfrm>
+            <a:off x="6049096" y="2713089"/>
+            <a:ext cx="1257834" cy="1178163"/>
+          </a:xfrm>
+          <a:prstGeom prst="rect">
+            <a:avLst/>
+          </a:prstGeom>
+          <a:noFill/>
+          <a:ln w="12700">
+            <a:solidFill>
+              <a:srgbClr val="DF3312"/>
+            </a:solidFill>
+          </a:ln>
+        </p:spPr>
+        <p:style>
+          <a:lnRef idx="2">
+            <a:schemeClr val="accent1">
+              <a:shade val="50000"/>
+            </a:schemeClr>
+          </a:lnRef>
+          <a:fillRef idx="1">
+            <a:schemeClr val="accent1"/>
+          </a:fillRef>
+          <a:effectRef idx="0">
+            <a:schemeClr val="accent1"/>
+          </a:effectRef>
+          <a:fontRef idx="minor">
+            <a:schemeClr val="lt1"/>
+          </a:fontRef>
+        </p:style>
+        <p:txBody>
+          <a:bodyPr rot="0" spcFirstLastPara="0" vertOverflow="overflow" horzOverflow="overflow" vert="horz" wrap="square" lIns="91440" tIns="91440" rIns="91440" bIns="45720" numCol="1" spcCol="0" rtlCol="0" fromWordArt="0" anchor="t" anchorCtr="1" forceAA="0" compatLnSpc="1">
+            <a:prstTxWarp prst="textNoShape">
+              <a:avLst/>
+            </a:prstTxWarp>
+            <a:noAutofit/>
+          </a:bodyPr>
+          <a:lstStyle/>
+          <a:p>
+            <a:pPr algn="l"/>
+            <a:r>
+              <a:rPr lang="en-US" sz="1200" dirty="0">
+                <a:solidFill>
+                  <a:srgbClr val="DF3312"/>
+                </a:solidFill>
+              </a:rPr>
+              <a:t>Security group </a:t>
+            </a:r>
+          </a:p>
+        </p:txBody>
+      </p:sp>
+      <p:sp>
+        <p:nvSpPr>
+          <p:cNvPr id="48" name="Rectangle 47">
+            <a:extLst>
+              <a:ext uri="{FF2B5EF4-FFF2-40B4-BE49-F238E27FC236}">
+                <a16:creationId xmlns:a16="http://schemas.microsoft.com/office/drawing/2014/main" id="{0A1394DE-F72A-F341-BF63-0C4C023A442D}"/>
+              </a:ext>
+            </a:extLst>
+          </p:cNvPr>
+          <p:cNvSpPr/>
+          <p:nvPr/>
+        </p:nvSpPr>
+        <p:spPr>
+          <a:xfrm>
+            <a:off x="9469196" y="2547382"/>
+            <a:ext cx="1257834" cy="1042853"/>
+          </a:xfrm>
+          <a:prstGeom prst="rect">
+            <a:avLst/>
+          </a:prstGeom>
+          <a:noFill/>
+          <a:ln w="12700">
+            <a:solidFill>
+              <a:srgbClr val="DF3312"/>
+            </a:solidFill>
+          </a:ln>
+        </p:spPr>
+        <p:style>
+          <a:lnRef idx="2">
+            <a:schemeClr val="accent1">
+              <a:shade val="50000"/>
+            </a:schemeClr>
+          </a:lnRef>
+          <a:fillRef idx="1">
+            <a:schemeClr val="accent1"/>
+          </a:fillRef>
+          <a:effectRef idx="0">
+            <a:schemeClr val="accent1"/>
+          </a:effectRef>
+          <a:fontRef idx="minor">
+            <a:schemeClr val="lt1"/>
+          </a:fontRef>
+        </p:style>
+        <p:txBody>
+          <a:bodyPr rot="0" spcFirstLastPara="0" vertOverflow="overflow" horzOverflow="overflow" vert="horz" wrap="square" lIns="91440" tIns="91440" rIns="91440" bIns="45720" numCol="1" spcCol="0" rtlCol="0" fromWordArt="0" anchor="t" anchorCtr="1" forceAA="0" compatLnSpc="1">
+            <a:prstTxWarp prst="textNoShape">
+              <a:avLst/>
+            </a:prstTxWarp>
+            <a:noAutofit/>
+          </a:bodyPr>
+          <a:lstStyle/>
+          <a:p>
+            <a:pPr algn="l"/>
+            <a:r>
+              <a:rPr lang="en-US" sz="1200" dirty="0">
+                <a:solidFill>
+                  <a:srgbClr val="DF3312"/>
+                </a:solidFill>
+              </a:rPr>
+              <a:t>Security group</a:t>
+            </a:r>
+          </a:p>
+        </p:txBody>
+      </p:sp>
+      <p:sp>
+        <p:nvSpPr>
+          <p:cNvPr id="50" name="TextBox 49">
+            <a:extLst>
+              <a:ext uri="{FF2B5EF4-FFF2-40B4-BE49-F238E27FC236}">
+                <a16:creationId xmlns:a16="http://schemas.microsoft.com/office/drawing/2014/main" id="{6CDF2933-41FC-3C4B-9BEA-796FCC3CF449}"/>
+              </a:ext>
+            </a:extLst>
+          </p:cNvPr>
+          <p:cNvSpPr txBox="1"/>
+          <p:nvPr/>
+        </p:nvSpPr>
+        <p:spPr>
+          <a:xfrm>
+            <a:off x="6012640" y="4365613"/>
+            <a:ext cx="1589097" cy="307777"/>
+          </a:xfrm>
+          <a:prstGeom prst="rect">
+            <a:avLst/>
+          </a:prstGeom>
+          <a:noFill/>
+        </p:spPr>
+        <p:txBody>
+          <a:bodyPr wrap="square" rtlCol="0">
+            <a:spAutoFit/>
+          </a:bodyPr>
+          <a:lstStyle/>
+          <a:p>
+            <a:pPr algn="ctr"/>
+            <a:r>
+              <a:rPr lang="en-US" sz="1400" dirty="0"/>
+              <a:t>Router</a:t>
+            </a:r>
+          </a:p>
+        </p:txBody>
+      </p:sp>
+      <p:pic>
+        <p:nvPicPr>
+          <p:cNvPr id="51" name="Graphic 50">
+            <a:extLst>
+              <a:ext uri="{FF2B5EF4-FFF2-40B4-BE49-F238E27FC236}">
+                <a16:creationId xmlns:a16="http://schemas.microsoft.com/office/drawing/2014/main" id="{2B2867A5-885A-0843-923B-3356941776C5}"/>
+              </a:ext>
+            </a:extLst>
+          </p:cNvPr>
+          <p:cNvPicPr>
+            <a:picLocks noChangeAspect="1"/>
+          </p:cNvPicPr>
+          <p:nvPr/>
+        </p:nvPicPr>
+        <p:blipFill>
+          <a:blip r:embed="rId23">
+            <a:extLst>
+              <a:ext uri="{96DAC541-7B7A-43D3-8B79-37D633B846F1}">
+                <asvg:svgBlip xmlns:asvg="http://schemas.microsoft.com/office/drawing/2016/SVG/main" r:embed="rId24"/>
+              </a:ext>
+            </a:extLst>
+          </a:blip>
+          <a:stretch>
+            <a:fillRect/>
+          </a:stretch>
+        </p:blipFill>
+        <p:spPr>
+          <a:xfrm>
+            <a:off x="6572238" y="3900031"/>
+            <a:ext cx="469900" cy="469900"/>
+          </a:xfrm>
+          <a:prstGeom prst="rect">
+            <a:avLst/>
+          </a:prstGeom>
+        </p:spPr>
+      </p:pic>
+      <p:sp>
+        <p:nvSpPr>
+          <p:cNvPr id="53" name="TextBox 52">
+            <a:extLst>
+              <a:ext uri="{FF2B5EF4-FFF2-40B4-BE49-F238E27FC236}">
+                <a16:creationId xmlns:a16="http://schemas.microsoft.com/office/drawing/2014/main" id="{62A075AF-93E1-A34F-9279-E1F91A4F74E9}"/>
+              </a:ext>
+            </a:extLst>
+          </p:cNvPr>
+          <p:cNvSpPr txBox="1"/>
+          <p:nvPr/>
+        </p:nvSpPr>
+        <p:spPr>
+          <a:xfrm>
+            <a:off x="9319183" y="4082027"/>
+            <a:ext cx="1589097" cy="307777"/>
+          </a:xfrm>
+          <a:prstGeom prst="rect">
+            <a:avLst/>
+          </a:prstGeom>
+          <a:noFill/>
+        </p:spPr>
+        <p:txBody>
+          <a:bodyPr wrap="square" rtlCol="0">
+            <a:spAutoFit/>
+          </a:bodyPr>
+          <a:lstStyle/>
+          <a:p>
+            <a:pPr algn="ctr"/>
+            <a:r>
+              <a:rPr lang="en-US" sz="1400" dirty="0"/>
+              <a:t>Router</a:t>
+            </a:r>
+          </a:p>
+        </p:txBody>
+      </p:sp>
+      <p:pic>
+        <p:nvPicPr>
+          <p:cNvPr id="55" name="Graphic 54">
+            <a:extLst>
+              <a:ext uri="{FF2B5EF4-FFF2-40B4-BE49-F238E27FC236}">
+                <a16:creationId xmlns:a16="http://schemas.microsoft.com/office/drawing/2014/main" id="{69813E60-E4BB-6C45-AF0F-E798438A0BD9}"/>
+              </a:ext>
+            </a:extLst>
+          </p:cNvPr>
+          <p:cNvPicPr>
+            <a:picLocks noChangeAspect="1"/>
+          </p:cNvPicPr>
+          <p:nvPr/>
+        </p:nvPicPr>
+        <p:blipFill>
+          <a:blip r:embed="rId23">
+            <a:extLst>
+              <a:ext uri="{96DAC541-7B7A-43D3-8B79-37D633B846F1}">
+                <asvg:svgBlip xmlns:asvg="http://schemas.microsoft.com/office/drawing/2016/SVG/main" r:embed="rId24"/>
+              </a:ext>
+            </a:extLst>
+          </a:blip>
+          <a:stretch>
+            <a:fillRect/>
+          </a:stretch>
+        </p:blipFill>
+        <p:spPr>
+          <a:xfrm>
+            <a:off x="9878781" y="3616445"/>
+            <a:ext cx="469900" cy="469900"/>
+          </a:xfrm>
+          <a:prstGeom prst="rect">
+            <a:avLst/>
+          </a:prstGeom>
+        </p:spPr>
+      </p:pic>
+      <p:cxnSp>
+        <p:nvCxnSpPr>
+          <p:cNvPr id="59" name="Straight Arrow Connector 58">
+            <a:extLst>
+              <a:ext uri="{FF2B5EF4-FFF2-40B4-BE49-F238E27FC236}">
+                <a16:creationId xmlns:a16="http://schemas.microsoft.com/office/drawing/2014/main" id="{5674902F-8DD6-504E-A538-5654F4799A7D}"/>
+              </a:ext>
+            </a:extLst>
+          </p:cNvPr>
+          <p:cNvCxnSpPr>
+            <a:cxnSpLocks/>
+            <a:stCxn id="45" idx="1"/>
+            <a:endCxn id="75" idx="2"/>
+          </p:cNvCxnSpPr>
+          <p:nvPr/>
+        </p:nvCxnSpPr>
+        <p:spPr>
+          <a:xfrm flipH="1" flipV="1">
+            <a:off x="3552084" y="3923621"/>
+            <a:ext cx="3757579" cy="1709018"/>
+          </a:xfrm>
+          <a:prstGeom prst="straightConnector1">
+            <a:avLst/>
+          </a:prstGeom>
+          <a:ln w="12700">
+            <a:solidFill>
+              <a:srgbClr val="545B64"/>
+            </a:solidFill>
+            <a:headEnd type="arrow" w="med" len="sm"/>
+            <a:tailEnd type="none" w="med" len="sm"/>
+          </a:ln>
+        </p:spPr>
+        <p:style>
+          <a:lnRef idx="1">
+            <a:schemeClr val="accent1"/>
+          </a:lnRef>
+          <a:fillRef idx="0">
+            <a:schemeClr val="accent1"/>
+          </a:fillRef>
+          <a:effectRef idx="0">
+            <a:schemeClr val="accent1"/>
+          </a:effectRef>
+          <a:fontRef idx="minor">
+            <a:schemeClr val="tx1"/>
+          </a:fontRef>
+        </p:style>
+      </p:cxnSp>
+      <p:cxnSp>
+        <p:nvCxnSpPr>
+          <p:cNvPr id="61" name="Straight Arrow Connector 60">
+            <a:extLst>
+              <a:ext uri="{FF2B5EF4-FFF2-40B4-BE49-F238E27FC236}">
+                <a16:creationId xmlns:a16="http://schemas.microsoft.com/office/drawing/2014/main" id="{0A427AC6-C10C-B044-AF91-7F60C159503E}"/>
+              </a:ext>
+            </a:extLst>
+          </p:cNvPr>
+          <p:cNvCxnSpPr>
+            <a:cxnSpLocks/>
+            <a:stCxn id="35" idx="3"/>
+            <a:endCxn id="51" idx="1"/>
+          </p:cNvCxnSpPr>
+          <p:nvPr/>
+        </p:nvCxnSpPr>
+        <p:spPr>
+          <a:xfrm>
+            <a:off x="5165691" y="3439316"/>
+            <a:ext cx="1406547" cy="695665"/>
+          </a:xfrm>
+          <a:prstGeom prst="straightConnector1">
+            <a:avLst/>
+          </a:prstGeom>
+          <a:ln w="12700">
+            <a:solidFill>
+              <a:srgbClr val="545B64"/>
+            </a:solidFill>
+            <a:headEnd type="arrow" w="med" len="sm"/>
+            <a:tailEnd type="none" w="med" len="sm"/>
+          </a:ln>
+        </p:spPr>
+        <p:style>
+          <a:lnRef idx="1">
+            <a:schemeClr val="accent1"/>
+          </a:lnRef>
+          <a:fillRef idx="0">
+            <a:schemeClr val="accent1"/>
+          </a:fillRef>
+          <a:effectRef idx="0">
+            <a:schemeClr val="accent1"/>
+          </a:effectRef>
+          <a:fontRef idx="minor">
+            <a:schemeClr val="tx1"/>
+          </a:fontRef>
+        </p:style>
+      </p:cxnSp>
+      <p:cxnSp>
+        <p:nvCxnSpPr>
+          <p:cNvPr id="65" name="Straight Arrow Connector 64">
+            <a:extLst>
+              <a:ext uri="{FF2B5EF4-FFF2-40B4-BE49-F238E27FC236}">
+                <a16:creationId xmlns:a16="http://schemas.microsoft.com/office/drawing/2014/main" id="{4EA0A5BB-11AE-F840-98F4-0BF7444FF58B}"/>
+              </a:ext>
+            </a:extLst>
+          </p:cNvPr>
+          <p:cNvCxnSpPr>
+            <a:cxnSpLocks/>
+            <a:stCxn id="47" idx="1"/>
+            <a:endCxn id="35" idx="3"/>
+          </p:cNvCxnSpPr>
+          <p:nvPr/>
+        </p:nvCxnSpPr>
+        <p:spPr>
+          <a:xfrm flipH="1">
+            <a:off x="5165691" y="3302171"/>
+            <a:ext cx="883405" cy="137145"/>
+          </a:xfrm>
+          <a:prstGeom prst="straightConnector1">
+            <a:avLst/>
+          </a:prstGeom>
+          <a:ln w="12700">
+            <a:solidFill>
+              <a:srgbClr val="545B64"/>
+            </a:solidFill>
+            <a:headEnd type="arrow" w="med" len="sm"/>
+            <a:tailEnd type="none" w="med" len="sm"/>
+          </a:ln>
+        </p:spPr>
+        <p:style>
+          <a:lnRef idx="1">
+            <a:schemeClr val="accent1"/>
+          </a:lnRef>
+          <a:fillRef idx="0">
+            <a:schemeClr val="accent1"/>
+          </a:fillRef>
+          <a:effectRef idx="0">
+            <a:schemeClr val="accent1"/>
+          </a:effectRef>
+          <a:fontRef idx="minor">
+            <a:schemeClr val="tx1"/>
+          </a:fontRef>
+        </p:style>
+      </p:cxnSp>
+    </p:spTree>
+    <p:extLst>
+      <p:ext uri="{BB962C8B-B14F-4D97-AF65-F5344CB8AC3E}">
+        <p14:creationId xmlns:p14="http://schemas.microsoft.com/office/powerpoint/2010/main" val="2264319154"/>
       </p:ext>
     </p:extLst>
   </p:cSld>

</xml_diff>